<commit_message>
Final report - 52
</commit_message>
<xml_diff>
--- a/report/Report_on_PyTorch_VGG16_training.pptx
+++ b/report/Report_on_PyTorch_VGG16_training.pptx
@@ -18,11 +18,13 @@
     <p:sldId id="265" r:id="rId12"/>
     <p:sldId id="271" r:id="rId13"/>
     <p:sldId id="272" r:id="rId14"/>
-    <p:sldId id="262" r:id="rId15"/>
-    <p:sldId id="266" r:id="rId16"/>
-    <p:sldId id="273" r:id="rId17"/>
-    <p:sldId id="263" r:id="rId18"/>
-    <p:sldId id="264" r:id="rId19"/>
+    <p:sldId id="274" r:id="rId15"/>
+    <p:sldId id="262" r:id="rId16"/>
+    <p:sldId id="266" r:id="rId17"/>
+    <p:sldId id="273" r:id="rId18"/>
+    <p:sldId id="275" r:id="rId19"/>
+    <p:sldId id="263" r:id="rId20"/>
+    <p:sldId id="264" r:id="rId21"/>
   </p:sldIdLst>
   <p:sldSz cx="12192000" cy="6858000"/>
   <p:notesSz cx="6858000" cy="9144000"/>
@@ -5807,6 +5809,170 @@
       <dsp:cNvGrpSpPr/>
     </dsp:nvGrpSpPr>
     <dsp:grpSpPr/>
+    <dsp:sp modelId="{9807E57E-1E7D-4108-BB7B-2B42E874305B}">
+      <dsp:nvSpPr>
+        <dsp:cNvPr id="0" name=""/>
+        <dsp:cNvSpPr/>
+      </dsp:nvSpPr>
+      <dsp:spPr>
+        <a:xfrm>
+          <a:off x="0" y="1228870"/>
+          <a:ext cx="10515600" cy="913678"/>
+        </a:xfrm>
+        <a:prstGeom prst="roundRect">
+          <a:avLst/>
+        </a:prstGeom>
+        <a:solidFill>
+          <a:schemeClr val="lt1">
+            <a:hueOff val="0"/>
+            <a:satOff val="0"/>
+            <a:lumOff val="0"/>
+            <a:alphaOff val="0"/>
+          </a:schemeClr>
+        </a:solidFill>
+        <a:ln w="12700" cap="flat" cmpd="sng" algn="ctr">
+          <a:solidFill>
+            <a:schemeClr val="accent1">
+              <a:shade val="80000"/>
+              <a:hueOff val="0"/>
+              <a:satOff val="0"/>
+              <a:lumOff val="0"/>
+              <a:alphaOff val="0"/>
+            </a:schemeClr>
+          </a:solidFill>
+          <a:prstDash val="solid"/>
+          <a:miter lim="800000"/>
+        </a:ln>
+        <a:effectLst/>
+      </dsp:spPr>
+      <dsp:style>
+        <a:lnRef idx="2">
+          <a:scrgbClr r="0" g="0" b="0"/>
+        </a:lnRef>
+        <a:fillRef idx="1">
+          <a:scrgbClr r="0" g="0" b="0"/>
+        </a:fillRef>
+        <a:effectRef idx="0">
+          <a:scrgbClr r="0" g="0" b="0"/>
+        </a:effectRef>
+        <a:fontRef idx="minor">
+          <a:schemeClr val="lt1"/>
+        </a:fontRef>
+      </dsp:style>
+      <dsp:txBody>
+        <a:bodyPr spcFirstLastPara="0" vert="horz" wrap="square" lIns="87630" tIns="87630" rIns="87630" bIns="87630" numCol="1" spcCol="1270" anchor="ctr" anchorCtr="0">
+          <a:noAutofit/>
+        </a:bodyPr>
+        <a:lstStyle/>
+        <a:p>
+          <a:pPr lvl="0" algn="l" defTabSz="1022350" rtl="0">
+            <a:lnSpc>
+              <a:spcPct val="90000"/>
+            </a:lnSpc>
+            <a:spcBef>
+              <a:spcPct val="0"/>
+            </a:spcBef>
+            <a:spcAft>
+              <a:spcPct val="35000"/>
+            </a:spcAft>
+          </a:pPr>
+          <a:r>
+            <a:rPr lang="en-US" sz="2300" kern="1200" dirty="0" smtClean="0"/>
+            <a:t>Download the ImageNet dataset and unzip the training and validation datasets </a:t>
+          </a:r>
+          <a:endParaRPr lang="en-US" sz="2300" kern="1200" dirty="0"/>
+        </a:p>
+      </dsp:txBody>
+      <dsp:txXfrm>
+        <a:off x="44602" y="1273472"/>
+        <a:ext cx="10426396" cy="824474"/>
+      </dsp:txXfrm>
+    </dsp:sp>
+    <dsp:sp modelId="{9383AB85-9175-4AB9-9D4F-781DA0266214}">
+      <dsp:nvSpPr>
+        <dsp:cNvPr id="0" name=""/>
+        <dsp:cNvSpPr/>
+      </dsp:nvSpPr>
+      <dsp:spPr>
+        <a:xfrm>
+          <a:off x="0" y="2208789"/>
+          <a:ext cx="10515600" cy="913678"/>
+        </a:xfrm>
+        <a:prstGeom prst="roundRect">
+          <a:avLst/>
+        </a:prstGeom>
+        <a:solidFill>
+          <a:schemeClr val="lt1">
+            <a:hueOff val="0"/>
+            <a:satOff val="0"/>
+            <a:lumOff val="0"/>
+            <a:alphaOff val="0"/>
+          </a:schemeClr>
+        </a:solidFill>
+        <a:ln w="12700" cap="flat" cmpd="sng" algn="ctr">
+          <a:solidFill>
+            <a:schemeClr val="accent1">
+              <a:shade val="80000"/>
+              <a:hueOff val="0"/>
+              <a:satOff val="0"/>
+              <a:lumOff val="0"/>
+              <a:alphaOff val="0"/>
+            </a:schemeClr>
+          </a:solidFill>
+          <a:prstDash val="solid"/>
+          <a:miter lim="800000"/>
+        </a:ln>
+        <a:effectLst/>
+      </dsp:spPr>
+      <dsp:style>
+        <a:lnRef idx="2">
+          <a:scrgbClr r="0" g="0" b="0"/>
+        </a:lnRef>
+        <a:fillRef idx="1">
+          <a:scrgbClr r="0" g="0" b="0"/>
+        </a:fillRef>
+        <a:effectRef idx="0">
+          <a:scrgbClr r="0" g="0" b="0"/>
+        </a:effectRef>
+        <a:fontRef idx="minor">
+          <a:schemeClr val="lt1"/>
+        </a:fontRef>
+      </dsp:style>
+      <dsp:txBody>
+        <a:bodyPr spcFirstLastPara="0" vert="horz" wrap="square" lIns="87630" tIns="87630" rIns="87630" bIns="87630" numCol="1" spcCol="1270" anchor="ctr" anchorCtr="0">
+          <a:noAutofit/>
+        </a:bodyPr>
+        <a:lstStyle/>
+        <a:p>
+          <a:pPr lvl="0" algn="l" defTabSz="1022350" rtl="0">
+            <a:lnSpc>
+              <a:spcPct val="90000"/>
+            </a:lnSpc>
+            <a:spcBef>
+              <a:spcPct val="0"/>
+            </a:spcBef>
+            <a:spcAft>
+              <a:spcPct val="35000"/>
+            </a:spcAft>
+          </a:pPr>
+          <a:r>
+            <a:rPr lang="en-US" sz="2300" kern="1200" dirty="0" smtClean="0"/>
+            <a:t>Move validation images to labeled subfolders using this script: </a:t>
+          </a:r>
+          <a:r>
+            <a:rPr lang="en-US" sz="2300" kern="1200" dirty="0" smtClean="0">
+              <a:hlinkClick xmlns:r="http://schemas.openxmlformats.org/officeDocument/2006/relationships" r:id="rId1"/>
+            </a:rPr>
+            <a:t>https://raw.githubusercontent.com/soumith/imagenetloader.torch/master/valprep.sh</a:t>
+          </a:r>
+          <a:endParaRPr lang="en-US" sz="2300" kern="1200" dirty="0"/>
+        </a:p>
+      </dsp:txBody>
+      <dsp:txXfrm>
+        <a:off x="44602" y="2253391"/>
+        <a:ext cx="10426396" cy="824474"/>
+      </dsp:txXfrm>
+    </dsp:sp>
   </dsp:spTree>
 </dsp:drawing>
 </file>
@@ -13866,7 +14032,7 @@
           <a:p>
             <a:fld id="{3F7B40EA-3425-4206-B086-E9ECD718184C}" type="datetimeFigureOut">
               <a:rPr lang="en-US" smtClean="0"/>
-              <a:t>12/13/2018</a:t>
+              <a:t>12/18/2018</a:t>
             </a:fld>
             <a:endParaRPr lang="en-US"/>
           </a:p>
@@ -14036,7 +14202,7 @@
           <a:p>
             <a:fld id="{3F7B40EA-3425-4206-B086-E9ECD718184C}" type="datetimeFigureOut">
               <a:rPr lang="en-US" smtClean="0"/>
-              <a:t>12/13/2018</a:t>
+              <a:t>12/18/2018</a:t>
             </a:fld>
             <a:endParaRPr lang="en-US"/>
           </a:p>
@@ -14216,7 +14382,7 @@
           <a:p>
             <a:fld id="{3F7B40EA-3425-4206-B086-E9ECD718184C}" type="datetimeFigureOut">
               <a:rPr lang="en-US" smtClean="0"/>
-              <a:t>12/13/2018</a:t>
+              <a:t>12/18/2018</a:t>
             </a:fld>
             <a:endParaRPr lang="en-US"/>
           </a:p>
@@ -14386,7 +14552,7 @@
           <a:p>
             <a:fld id="{3F7B40EA-3425-4206-B086-E9ECD718184C}" type="datetimeFigureOut">
               <a:rPr lang="en-US" smtClean="0"/>
-              <a:t>12/13/2018</a:t>
+              <a:t>12/18/2018</a:t>
             </a:fld>
             <a:endParaRPr lang="en-US"/>
           </a:p>
@@ -14632,7 +14798,7 @@
           <a:p>
             <a:fld id="{3F7B40EA-3425-4206-B086-E9ECD718184C}" type="datetimeFigureOut">
               <a:rPr lang="en-US" smtClean="0"/>
-              <a:t>12/13/2018</a:t>
+              <a:t>12/18/2018</a:t>
             </a:fld>
             <a:endParaRPr lang="en-US"/>
           </a:p>
@@ -14864,7 +15030,7 @@
           <a:p>
             <a:fld id="{3F7B40EA-3425-4206-B086-E9ECD718184C}" type="datetimeFigureOut">
               <a:rPr lang="en-US" smtClean="0"/>
-              <a:t>12/13/2018</a:t>
+              <a:t>12/18/2018</a:t>
             </a:fld>
             <a:endParaRPr lang="en-US"/>
           </a:p>
@@ -15231,7 +15397,7 @@
           <a:p>
             <a:fld id="{3F7B40EA-3425-4206-B086-E9ECD718184C}" type="datetimeFigureOut">
               <a:rPr lang="en-US" smtClean="0"/>
-              <a:t>12/13/2018</a:t>
+              <a:t>12/18/2018</a:t>
             </a:fld>
             <a:endParaRPr lang="en-US"/>
           </a:p>
@@ -15349,7 +15515,7 @@
           <a:p>
             <a:fld id="{3F7B40EA-3425-4206-B086-E9ECD718184C}" type="datetimeFigureOut">
               <a:rPr lang="en-US" smtClean="0"/>
-              <a:t>12/13/2018</a:t>
+              <a:t>12/18/2018</a:t>
             </a:fld>
             <a:endParaRPr lang="en-US"/>
           </a:p>
@@ -15444,7 +15610,7 @@
           <a:p>
             <a:fld id="{3F7B40EA-3425-4206-B086-E9ECD718184C}" type="datetimeFigureOut">
               <a:rPr lang="en-US" smtClean="0"/>
-              <a:t>12/13/2018</a:t>
+              <a:t>12/18/2018</a:t>
             </a:fld>
             <a:endParaRPr lang="en-US"/>
           </a:p>
@@ -15721,7 +15887,7 @@
           <a:p>
             <a:fld id="{3F7B40EA-3425-4206-B086-E9ECD718184C}" type="datetimeFigureOut">
               <a:rPr lang="en-US" smtClean="0"/>
-              <a:t>12/13/2018</a:t>
+              <a:t>12/18/2018</a:t>
             </a:fld>
             <a:endParaRPr lang="en-US"/>
           </a:p>
@@ -15974,7 +16140,7 @@
           <a:p>
             <a:fld id="{3F7B40EA-3425-4206-B086-E9ECD718184C}" type="datetimeFigureOut">
               <a:rPr lang="en-US" smtClean="0"/>
-              <a:t>12/13/2018</a:t>
+              <a:t>12/18/2018</a:t>
             </a:fld>
             <a:endParaRPr lang="en-US"/>
           </a:p>
@@ -16187,7 +16353,7 @@
           <a:p>
             <a:fld id="{3F7B40EA-3425-4206-B086-E9ECD718184C}" type="datetimeFigureOut">
               <a:rPr lang="en-US" smtClean="0"/>
-              <a:t>12/13/2018</a:t>
+              <a:t>12/18/2018</a:t>
             </a:fld>
             <a:endParaRPr lang="en-US"/>
           </a:p>
@@ -16941,7 +17107,6 @@
               <a:rPr lang="en-US" dirty="0"/>
               <a:t>3</a:t>
             </a:r>
-            <a:endParaRPr lang="en-US" dirty="0"/>
           </a:p>
         </p:txBody>
       </p:sp>
@@ -17175,6 +17340,124 @@
           <a:p>
             <a:r>
               <a:rPr lang="en-US" dirty="0" smtClean="0"/>
+              <a:t>Training 5</a:t>
+            </a:r>
+            <a:endParaRPr lang="en-US" dirty="0"/>
+          </a:p>
+        </p:txBody>
+      </p:sp>
+      <p:pic>
+        <p:nvPicPr>
+          <p:cNvPr id="6" name="Content Placeholder 5"/>
+          <p:cNvPicPr>
+            <a:picLocks noGrp="1" noChangeAspect="1"/>
+          </p:cNvPicPr>
+          <p:nvPr>
+            <p:ph sz="half" idx="1"/>
+          </p:nvPr>
+        </p:nvPicPr>
+        <p:blipFill>
+          <a:blip r:embed="rId2">
+            <a:extLst>
+              <a:ext uri="{28A0092B-C50C-407E-A947-70E740481C1C}">
+                <a14:useLocalDpi xmlns:a14="http://schemas.microsoft.com/office/drawing/2010/main" val="0"/>
+              </a:ext>
+            </a:extLst>
+          </a:blip>
+          <a:stretch>
+            <a:fillRect/>
+          </a:stretch>
+        </p:blipFill>
+        <p:spPr>
+          <a:xfrm>
+            <a:off x="838200" y="2457886"/>
+            <a:ext cx="5181600" cy="3086816"/>
+          </a:xfrm>
+        </p:spPr>
+      </p:pic>
+      <p:pic>
+        <p:nvPicPr>
+          <p:cNvPr id="7" name="Content Placeholder 6"/>
+          <p:cNvPicPr>
+            <a:picLocks noGrp="1" noChangeAspect="1"/>
+          </p:cNvPicPr>
+          <p:nvPr>
+            <p:ph sz="half" idx="2"/>
+          </p:nvPr>
+        </p:nvPicPr>
+        <p:blipFill>
+          <a:blip r:embed="rId3">
+            <a:extLst>
+              <a:ext uri="{28A0092B-C50C-407E-A947-70E740481C1C}">
+                <a14:useLocalDpi xmlns:a14="http://schemas.microsoft.com/office/drawing/2010/main" val="0"/>
+              </a:ext>
+            </a:extLst>
+          </a:blip>
+          <a:stretch>
+            <a:fillRect/>
+          </a:stretch>
+        </p:blipFill>
+        <p:spPr>
+          <a:xfrm>
+            <a:off x="6172200" y="2451243"/>
+            <a:ext cx="5181600" cy="3100102"/>
+          </a:xfrm>
+        </p:spPr>
+      </p:pic>
+    </p:spTree>
+    <p:extLst>
+      <p:ext uri="{BB962C8B-B14F-4D97-AF65-F5344CB8AC3E}">
+        <p14:creationId xmlns:p14="http://schemas.microsoft.com/office/powerpoint/2010/main" val="49128426"/>
+      </p:ext>
+    </p:extLst>
+  </p:cSld>
+  <p:clrMapOvr>
+    <a:masterClrMapping/>
+  </p:clrMapOvr>
+  <p:timing>
+    <p:tnLst>
+      <p:par>
+        <p:cTn id="1" dur="indefinite" restart="never" nodeType="tmRoot"/>
+      </p:par>
+    </p:tnLst>
+  </p:timing>
+</p:sld>
+</file>
+
+<file path=ppt/slides/slide15.xml><?xml version="1.0" encoding="utf-8"?>
+<p:sld xmlns:a="http://schemas.openxmlformats.org/drawingml/2006/main" xmlns:r="http://schemas.openxmlformats.org/officeDocument/2006/relationships" xmlns:p="http://schemas.openxmlformats.org/presentationml/2006/main">
+  <p:cSld>
+    <p:spTree>
+      <p:nvGrpSpPr>
+        <p:cNvPr id="1" name=""/>
+        <p:cNvGrpSpPr/>
+        <p:nvPr/>
+      </p:nvGrpSpPr>
+      <p:grpSpPr>
+        <a:xfrm>
+          <a:off x="0" y="0"/>
+          <a:ext cx="0" cy="0"/>
+          <a:chOff x="0" y="0"/>
+          <a:chExt cx="0" cy="0"/>
+        </a:xfrm>
+      </p:grpSpPr>
+      <p:sp>
+        <p:nvSpPr>
+          <p:cNvPr id="2" name="Title 1"/>
+          <p:cNvSpPr>
+            <a:spLocks noGrp="1"/>
+          </p:cNvSpPr>
+          <p:nvPr>
+            <p:ph type="title"/>
+          </p:nvPr>
+        </p:nvSpPr>
+        <p:spPr/>
+        <p:txBody>
+          <a:bodyPr/>
+          <a:lstStyle/>
+          <a:p>
+            <a:r>
+              <a:rPr lang="en-US" dirty="0" smtClean="0"/>
               <a:t>Validation 1</a:t>
             </a:r>
             <a:endParaRPr lang="en-US" dirty="0"/>
@@ -17259,7 +17542,7 @@
 </p:sld>
 </file>
 
-<file path=ppt/slides/slide15.xml><?xml version="1.0" encoding="utf-8"?>
+<file path=ppt/slides/slide16.xml><?xml version="1.0" encoding="utf-8"?>
 <p:sld xmlns:a="http://schemas.openxmlformats.org/drawingml/2006/main" xmlns:r="http://schemas.openxmlformats.org/officeDocument/2006/relationships" xmlns:p="http://schemas.openxmlformats.org/presentationml/2006/main">
   <p:cSld>
     <p:spTree>
@@ -17299,7 +17582,6 @@
               <a:rPr lang="en-US" dirty="0"/>
               <a:t>2</a:t>
             </a:r>
-            <a:endParaRPr lang="en-US" dirty="0"/>
           </a:p>
         </p:txBody>
       </p:sp>
@@ -17381,7 +17663,7 @@
 </p:sld>
 </file>
 
-<file path=ppt/slides/slide16.xml><?xml version="1.0" encoding="utf-8"?>
+<file path=ppt/slides/slide17.xml><?xml version="1.0" encoding="utf-8"?>
 <p:sld xmlns:a="http://schemas.openxmlformats.org/drawingml/2006/main" xmlns:r="http://schemas.openxmlformats.org/officeDocument/2006/relationships" xmlns:p="http://schemas.openxmlformats.org/presentationml/2006/main">
   <p:cSld>
     <p:spTree>
@@ -17499,7 +17781,125 @@
 </p:sld>
 </file>
 
-<file path=ppt/slides/slide17.xml><?xml version="1.0" encoding="utf-8"?>
+<file path=ppt/slides/slide18.xml><?xml version="1.0" encoding="utf-8"?>
+<p:sld xmlns:a="http://schemas.openxmlformats.org/drawingml/2006/main" xmlns:r="http://schemas.openxmlformats.org/officeDocument/2006/relationships" xmlns:p="http://schemas.openxmlformats.org/presentationml/2006/main">
+  <p:cSld>
+    <p:spTree>
+      <p:nvGrpSpPr>
+        <p:cNvPr id="1" name=""/>
+        <p:cNvGrpSpPr/>
+        <p:nvPr/>
+      </p:nvGrpSpPr>
+      <p:grpSpPr>
+        <a:xfrm>
+          <a:off x="0" y="0"/>
+          <a:ext cx="0" cy="0"/>
+          <a:chOff x="0" y="0"/>
+          <a:chExt cx="0" cy="0"/>
+        </a:xfrm>
+      </p:grpSpPr>
+      <p:sp>
+        <p:nvSpPr>
+          <p:cNvPr id="2" name="Title 1"/>
+          <p:cNvSpPr>
+            <a:spLocks noGrp="1"/>
+          </p:cNvSpPr>
+          <p:nvPr>
+            <p:ph type="title"/>
+          </p:nvPr>
+        </p:nvSpPr>
+        <p:spPr/>
+        <p:txBody>
+          <a:bodyPr/>
+          <a:lstStyle/>
+          <a:p>
+            <a:r>
+              <a:rPr lang="en-US" dirty="0" smtClean="0"/>
+              <a:t>Validation 4</a:t>
+            </a:r>
+            <a:endParaRPr lang="en-US" dirty="0"/>
+          </a:p>
+        </p:txBody>
+      </p:sp>
+      <p:pic>
+        <p:nvPicPr>
+          <p:cNvPr id="6" name="Content Placeholder 5"/>
+          <p:cNvPicPr>
+            <a:picLocks noGrp="1" noChangeAspect="1"/>
+          </p:cNvPicPr>
+          <p:nvPr>
+            <p:ph sz="half" idx="1"/>
+          </p:nvPr>
+        </p:nvPicPr>
+        <p:blipFill>
+          <a:blip r:embed="rId2">
+            <a:extLst>
+              <a:ext uri="{28A0092B-C50C-407E-A947-70E740481C1C}">
+                <a14:useLocalDpi xmlns:a14="http://schemas.microsoft.com/office/drawing/2010/main" val="0"/>
+              </a:ext>
+            </a:extLst>
+          </a:blip>
+          <a:stretch>
+            <a:fillRect/>
+          </a:stretch>
+        </p:blipFill>
+        <p:spPr>
+          <a:xfrm>
+            <a:off x="838200" y="2463701"/>
+            <a:ext cx="5181600" cy="3075186"/>
+          </a:xfrm>
+        </p:spPr>
+      </p:pic>
+      <p:pic>
+        <p:nvPicPr>
+          <p:cNvPr id="7" name="Content Placeholder 6"/>
+          <p:cNvPicPr>
+            <a:picLocks noGrp="1" noChangeAspect="1"/>
+          </p:cNvPicPr>
+          <p:nvPr>
+            <p:ph sz="half" idx="2"/>
+          </p:nvPr>
+        </p:nvPicPr>
+        <p:blipFill>
+          <a:blip r:embed="rId3">
+            <a:extLst>
+              <a:ext uri="{28A0092B-C50C-407E-A947-70E740481C1C}">
+                <a14:useLocalDpi xmlns:a14="http://schemas.microsoft.com/office/drawing/2010/main" val="0"/>
+              </a:ext>
+            </a:extLst>
+          </a:blip>
+          <a:stretch>
+            <a:fillRect/>
+          </a:stretch>
+        </p:blipFill>
+        <p:spPr>
+          <a:xfrm>
+            <a:off x="6172200" y="2458782"/>
+            <a:ext cx="5181600" cy="3085024"/>
+          </a:xfrm>
+        </p:spPr>
+      </p:pic>
+    </p:spTree>
+    <p:extLst>
+      <p:ext uri="{BB962C8B-B14F-4D97-AF65-F5344CB8AC3E}">
+        <p14:creationId xmlns:p14="http://schemas.microsoft.com/office/powerpoint/2010/main" val="706746501"/>
+      </p:ext>
+    </p:extLst>
+  </p:cSld>
+  <p:clrMapOvr>
+    <a:masterClrMapping/>
+  </p:clrMapOvr>
+  <p:timing>
+    <p:tnLst>
+      <p:par>
+        <p:cTn id="1" dur="indefinite" restart="never" nodeType="tmRoot"/>
+      </p:par>
+    </p:tnLst>
+  </p:timing>
+</p:sld>
+</file>
+
+<file path=ppt/slides/slide19.xml><?xml version="1.0" encoding="utf-8"?>
 <p:sld xmlns:a="http://schemas.openxmlformats.org/drawingml/2006/main" xmlns:r="http://schemas.openxmlformats.org/officeDocument/2006/relationships" xmlns:p="http://schemas.openxmlformats.org/presentationml/2006/main">
   <p:cSld>
     <p:spTree>
@@ -17549,14 +17949,14 @@
             <p:ph idx="1"/>
             <p:extLst>
               <p:ext uri="{D42A27DB-BD31-4B8C-83A1-F6EECF244321}">
-                <p14:modId xmlns:p14="http://schemas.microsoft.com/office/powerpoint/2010/main" val="2594396299"/>
+                <p14:modId xmlns:p14="http://schemas.microsoft.com/office/powerpoint/2010/main" val="1109485380"/>
               </p:ext>
             </p:extLst>
           </p:nvPr>
         </p:nvGraphicFramePr>
         <p:xfrm>
           <a:off x="838200" y="1825625"/>
-          <a:ext cx="10515600" cy="4079240"/>
+          <a:ext cx="10515600" cy="4450080"/>
         </p:xfrm>
         <a:graphic>
           <a:graphicData uri="http://schemas.openxmlformats.org/drawingml/2006/table">
@@ -17605,10 +18005,10 @@
                     <a:lstStyle/>
                     <a:p>
                       <a:r>
-                        <a:rPr lang="en-US" dirty="0" smtClean="0"/>
-                        <a:t>Epoch</a:t>
+                        <a:rPr lang="en-US" b="0" dirty="0" smtClean="0"/>
+                        <a:t>Epochs</a:t>
                       </a:r>
-                      <a:endParaRPr lang="en-US" dirty="0"/>
+                      <a:endParaRPr lang="en-US" b="0" dirty="0"/>
                     </a:p>
                   </a:txBody>
                   <a:tcPr/>
@@ -17619,10 +18019,10 @@
                     <a:lstStyle/>
                     <a:p>
                       <a:r>
-                        <a:rPr lang="en-US" dirty="0" smtClean="0"/>
-                        <a:t>40</a:t>
+                        <a:rPr lang="en-US" b="0" dirty="0" smtClean="0"/>
+                        <a:t>52</a:t>
                       </a:r>
-                      <a:endParaRPr lang="en-US" dirty="0"/>
+                      <a:endParaRPr lang="en-US" b="0" dirty="0"/>
                     </a:p>
                   </a:txBody>
                   <a:tcPr/>
@@ -17635,10 +18035,18 @@
                     <a:lstStyle/>
                     <a:p>
                       <a:r>
-                        <a:rPr lang="en-US" dirty="0" smtClean="0"/>
+                        <a:rPr lang="en-US" dirty="0" smtClean="0">
+                          <a:solidFill>
+                            <a:srgbClr val="00B050"/>
+                          </a:solidFill>
+                        </a:rPr>
                         <a:t>Training accuracy – Top 1</a:t>
                       </a:r>
-                      <a:endParaRPr lang="en-US" dirty="0"/>
+                      <a:endParaRPr lang="en-US" dirty="0">
+                        <a:solidFill>
+                          <a:srgbClr val="00B050"/>
+                        </a:solidFill>
+                      </a:endParaRPr>
                     </a:p>
                   </a:txBody>
                   <a:tcPr/>
@@ -17649,10 +18057,18 @@
                     <a:lstStyle/>
                     <a:p>
                       <a:r>
-                        <a:rPr lang="en-US" dirty="0" smtClean="0"/>
-                        <a:t>0.59</a:t>
+                        <a:rPr lang="en-US" dirty="0" smtClean="0">
+                          <a:solidFill>
+                            <a:srgbClr val="00B050"/>
+                          </a:solidFill>
+                        </a:rPr>
+                        <a:t>0.61</a:t>
                       </a:r>
-                      <a:endParaRPr lang="en-US" dirty="0"/>
+                      <a:endParaRPr lang="en-US" dirty="0">
+                        <a:solidFill>
+                          <a:srgbClr val="00B050"/>
+                        </a:solidFill>
+                      </a:endParaRPr>
                     </a:p>
                   </a:txBody>
                   <a:tcPr/>
@@ -17665,10 +18081,18 @@
                     <a:lstStyle/>
                     <a:p>
                       <a:r>
-                        <a:rPr lang="en-US" dirty="0" smtClean="0"/>
+                        <a:rPr lang="en-US" dirty="0" smtClean="0">
+                          <a:solidFill>
+                            <a:srgbClr val="00B050"/>
+                          </a:solidFill>
+                        </a:rPr>
                         <a:t>Training accuracy – Top 5</a:t>
                       </a:r>
-                      <a:endParaRPr lang="en-US" dirty="0"/>
+                      <a:endParaRPr lang="en-US" dirty="0">
+                        <a:solidFill>
+                          <a:srgbClr val="00B050"/>
+                        </a:solidFill>
+                      </a:endParaRPr>
                     </a:p>
                   </a:txBody>
                   <a:tcPr/>
@@ -17679,10 +18103,18 @@
                     <a:lstStyle/>
                     <a:p>
                       <a:r>
-                        <a:rPr lang="en-US" dirty="0" smtClean="0"/>
-                        <a:t>0.81</a:t>
+                        <a:rPr lang="en-US" dirty="0" smtClean="0">
+                          <a:solidFill>
+                            <a:srgbClr val="00B050"/>
+                          </a:solidFill>
+                        </a:rPr>
+                        <a:t>0.82</a:t>
                       </a:r>
-                      <a:endParaRPr lang="en-US" dirty="0"/>
+                      <a:endParaRPr lang="en-US" dirty="0">
+                        <a:solidFill>
+                          <a:srgbClr val="00B050"/>
+                        </a:solidFill>
+                      </a:endParaRPr>
                     </a:p>
                   </a:txBody>
                   <a:tcPr/>
@@ -17695,10 +18127,18 @@
                     <a:lstStyle/>
                     <a:p>
                       <a:r>
-                        <a:rPr lang="en-US" dirty="0" smtClean="0"/>
+                        <a:rPr lang="en-US" dirty="0" smtClean="0">
+                          <a:solidFill>
+                            <a:srgbClr val="FF0000"/>
+                          </a:solidFill>
+                        </a:rPr>
                         <a:t>Validation accuracy – Top 1</a:t>
                       </a:r>
-                      <a:endParaRPr lang="en-US" dirty="0"/>
+                      <a:endParaRPr lang="en-US" dirty="0">
+                        <a:solidFill>
+                          <a:srgbClr val="FF0000"/>
+                        </a:solidFill>
+                      </a:endParaRPr>
                     </a:p>
                   </a:txBody>
                   <a:tcPr/>
@@ -17709,10 +18149,18 @@
                     <a:lstStyle/>
                     <a:p>
                       <a:r>
-                        <a:rPr lang="en-US" dirty="0" smtClean="0"/>
-                        <a:t>0.67</a:t>
+                        <a:rPr lang="en-US" dirty="0" smtClean="0">
+                          <a:solidFill>
+                            <a:srgbClr val="FF0000"/>
+                          </a:solidFill>
+                        </a:rPr>
+                        <a:t>0.69</a:t>
                       </a:r>
-                      <a:endParaRPr lang="en-US" dirty="0"/>
+                      <a:endParaRPr lang="en-US" dirty="0">
+                        <a:solidFill>
+                          <a:srgbClr val="FF0000"/>
+                        </a:solidFill>
+                      </a:endParaRPr>
                     </a:p>
                   </a:txBody>
                   <a:tcPr/>
@@ -17742,7 +18190,11 @@
                         <a:defRPr/>
                       </a:pPr>
                       <a:r>
-                        <a:rPr lang="en-US" dirty="0" smtClean="0"/>
+                        <a:rPr lang="en-US" dirty="0" smtClean="0">
+                          <a:solidFill>
+                            <a:srgbClr val="FF0000"/>
+                          </a:solidFill>
+                        </a:rPr>
                         <a:t>Validation accuracy – Top 5</a:t>
                       </a:r>
                     </a:p>
@@ -17755,10 +18207,18 @@
                     <a:lstStyle/>
                     <a:p>
                       <a:r>
-                        <a:rPr lang="en-US" dirty="0" smtClean="0"/>
-                        <a:t>0.88</a:t>
+                        <a:rPr lang="en-US" dirty="0" smtClean="0">
+                          <a:solidFill>
+                            <a:srgbClr val="FF0000"/>
+                          </a:solidFill>
+                        </a:rPr>
+                        <a:t>0.89</a:t>
                       </a:r>
-                      <a:endParaRPr lang="en-US" dirty="0"/>
+                      <a:endParaRPr lang="en-US" dirty="0">
+                        <a:solidFill>
+                          <a:srgbClr val="FF0000"/>
+                        </a:solidFill>
+                      </a:endParaRPr>
                     </a:p>
                   </a:txBody>
                   <a:tcPr/>
@@ -17832,7 +18292,7 @@
                     <a:p>
                       <a:r>
                         <a:rPr lang="en-US" dirty="0" smtClean="0"/>
-                        <a:t>Loss</a:t>
+                        <a:t>Training Loss</a:t>
                       </a:r>
                       <a:endParaRPr lang="en-US" dirty="0"/>
                     </a:p>
@@ -17846,7 +18306,37 @@
                     <a:p>
                       <a:r>
                         <a:rPr lang="en-US" dirty="0" smtClean="0"/>
-                        <a:t>1.88</a:t>
+                        <a:t>1.66</a:t>
+                      </a:r>
+                      <a:endParaRPr lang="en-US" dirty="0"/>
+                    </a:p>
+                  </a:txBody>
+                  <a:tcPr/>
+                </a:tc>
+              </a:tr>
+              <a:tr h="370840">
+                <a:tc>
+                  <a:txBody>
+                    <a:bodyPr/>
+                    <a:lstStyle/>
+                    <a:p>
+                      <a:r>
+                        <a:rPr lang="en-US" dirty="0" smtClean="0"/>
+                        <a:t>Validation Loss</a:t>
+                      </a:r>
+                      <a:endParaRPr lang="en-US" dirty="0"/>
+                    </a:p>
+                  </a:txBody>
+                  <a:tcPr/>
+                </a:tc>
+                <a:tc>
+                  <a:txBody>
+                    <a:bodyPr/>
+                    <a:lstStyle/>
+                    <a:p>
+                      <a:r>
+                        <a:rPr lang="en-US" dirty="0" smtClean="0"/>
+                        <a:t>1.26</a:t>
                       </a:r>
                       <a:endParaRPr lang="en-US" dirty="0"/>
                     </a:p>
@@ -17926,85 +18416,6 @@
     <p:extLst>
       <p:ext uri="{BB962C8B-B14F-4D97-AF65-F5344CB8AC3E}">
         <p14:creationId xmlns:p14="http://schemas.microsoft.com/office/powerpoint/2010/main" val="919864278"/>
-      </p:ext>
-    </p:extLst>
-  </p:cSld>
-  <p:clrMapOvr>
-    <a:masterClrMapping/>
-  </p:clrMapOvr>
-  <p:timing>
-    <p:tnLst>
-      <p:par>
-        <p:cTn id="1" dur="indefinite" restart="never" nodeType="tmRoot"/>
-      </p:par>
-    </p:tnLst>
-  </p:timing>
-</p:sld>
-</file>
-
-<file path=ppt/slides/slide18.xml><?xml version="1.0" encoding="utf-8"?>
-<p:sld xmlns:a="http://schemas.openxmlformats.org/drawingml/2006/main" xmlns:r="http://schemas.openxmlformats.org/officeDocument/2006/relationships" xmlns:p="http://schemas.openxmlformats.org/presentationml/2006/main">
-  <p:cSld>
-    <p:spTree>
-      <p:nvGrpSpPr>
-        <p:cNvPr id="1" name=""/>
-        <p:cNvGrpSpPr/>
-        <p:nvPr/>
-      </p:nvGrpSpPr>
-      <p:grpSpPr>
-        <a:xfrm>
-          <a:off x="0" y="0"/>
-          <a:ext cx="0" cy="0"/>
-          <a:chOff x="0" y="0"/>
-          <a:chExt cx="0" cy="0"/>
-        </a:xfrm>
-      </p:grpSpPr>
-      <p:sp>
-        <p:nvSpPr>
-          <p:cNvPr id="2" name="Title 1"/>
-          <p:cNvSpPr>
-            <a:spLocks noGrp="1"/>
-          </p:cNvSpPr>
-          <p:nvPr>
-            <p:ph type="title"/>
-          </p:nvPr>
-        </p:nvSpPr>
-        <p:spPr/>
-        <p:txBody>
-          <a:bodyPr/>
-          <a:lstStyle/>
-          <a:p>
-            <a:r>
-              <a:rPr lang="en-US" dirty="0" smtClean="0"/>
-              <a:t>Discussion</a:t>
-            </a:r>
-            <a:endParaRPr lang="en-US" dirty="0"/>
-          </a:p>
-        </p:txBody>
-      </p:sp>
-      <p:sp>
-        <p:nvSpPr>
-          <p:cNvPr id="3" name="Content Placeholder 2"/>
-          <p:cNvSpPr>
-            <a:spLocks noGrp="1"/>
-          </p:cNvSpPr>
-          <p:nvPr>
-            <p:ph idx="1"/>
-          </p:nvPr>
-        </p:nvSpPr>
-        <p:spPr/>
-        <p:txBody>
-          <a:bodyPr/>
-          <a:lstStyle/>
-          <a:p>
-            <a:endParaRPr lang="en-US"/>
-          </a:p>
-        </p:txBody>
-      </p:sp>
-    </p:spTree>
-    <p:extLst>
-      <p:ext uri="{BB962C8B-B14F-4D97-AF65-F5344CB8AC3E}">
-        <p14:creationId xmlns:p14="http://schemas.microsoft.com/office/powerpoint/2010/main" val="1159741821"/>
       </p:ext>
     </p:extLst>
   </p:cSld>
@@ -18108,6 +18519,99 @@
     <p:extLst>
       <p:ext uri="{BB962C8B-B14F-4D97-AF65-F5344CB8AC3E}">
         <p14:creationId xmlns:p14="http://schemas.microsoft.com/office/powerpoint/2010/main" val="2918586553"/>
+      </p:ext>
+    </p:extLst>
+  </p:cSld>
+  <p:clrMapOvr>
+    <a:masterClrMapping/>
+  </p:clrMapOvr>
+  <p:timing>
+    <p:tnLst>
+      <p:par>
+        <p:cTn id="1" dur="indefinite" restart="never" nodeType="tmRoot"/>
+      </p:par>
+    </p:tnLst>
+  </p:timing>
+</p:sld>
+</file>
+
+<file path=ppt/slides/slide20.xml><?xml version="1.0" encoding="utf-8"?>
+<p:sld xmlns:a="http://schemas.openxmlformats.org/drawingml/2006/main" xmlns:r="http://schemas.openxmlformats.org/officeDocument/2006/relationships" xmlns:p="http://schemas.openxmlformats.org/presentationml/2006/main">
+  <p:cSld>
+    <p:spTree>
+      <p:nvGrpSpPr>
+        <p:cNvPr id="1" name=""/>
+        <p:cNvGrpSpPr/>
+        <p:nvPr/>
+      </p:nvGrpSpPr>
+      <p:grpSpPr>
+        <a:xfrm>
+          <a:off x="0" y="0"/>
+          <a:ext cx="0" cy="0"/>
+          <a:chOff x="0" y="0"/>
+          <a:chExt cx="0" cy="0"/>
+        </a:xfrm>
+      </p:grpSpPr>
+      <p:sp>
+        <p:nvSpPr>
+          <p:cNvPr id="2" name="Title 1"/>
+          <p:cNvSpPr>
+            <a:spLocks noGrp="1"/>
+          </p:cNvSpPr>
+          <p:nvPr>
+            <p:ph type="title"/>
+          </p:nvPr>
+        </p:nvSpPr>
+        <p:spPr/>
+        <p:txBody>
+          <a:bodyPr/>
+          <a:lstStyle/>
+          <a:p>
+            <a:r>
+              <a:rPr lang="en-US" dirty="0" smtClean="0"/>
+              <a:t>Discussion</a:t>
+            </a:r>
+            <a:endParaRPr lang="en-US" dirty="0"/>
+          </a:p>
+        </p:txBody>
+      </p:sp>
+      <p:sp>
+        <p:nvSpPr>
+          <p:cNvPr id="3" name="Content Placeholder 2"/>
+          <p:cNvSpPr>
+            <a:spLocks noGrp="1"/>
+          </p:cNvSpPr>
+          <p:nvPr>
+            <p:ph idx="1"/>
+          </p:nvPr>
+        </p:nvSpPr>
+        <p:spPr/>
+        <p:txBody>
+          <a:bodyPr/>
+          <a:lstStyle/>
+          <a:p>
+            <a:r>
+              <a:rPr lang="en-US" dirty="0"/>
+              <a:t>A</a:t>
+            </a:r>
+            <a:r>
+              <a:rPr lang="en-US" dirty="0" smtClean="0"/>
+              <a:t>ccuracy seems to be improving with more number of epochs</a:t>
+            </a:r>
+          </a:p>
+          <a:p>
+            <a:r>
+              <a:rPr lang="en-US" dirty="0" smtClean="0"/>
+              <a:t>May able to achieve the original model performance</a:t>
+            </a:r>
+            <a:endParaRPr lang="en-US" dirty="0"/>
+          </a:p>
+        </p:txBody>
+      </p:sp>
+    </p:spTree>
+    <p:extLst>
+      <p:ext uri="{BB962C8B-B14F-4D97-AF65-F5344CB8AC3E}">
+        <p14:creationId xmlns:p14="http://schemas.microsoft.com/office/powerpoint/2010/main" val="1159741821"/>
       </p:ext>
     </p:extLst>
   </p:cSld>
@@ -18715,7 +19219,7 @@
             <p:ph idx="1"/>
             <p:extLst>
               <p:ext uri="{D42A27DB-BD31-4B8C-83A1-F6EECF244321}">
-                <p14:modId xmlns:p14="http://schemas.microsoft.com/office/powerpoint/2010/main" val="3368752354"/>
+                <p14:modId xmlns:p14="http://schemas.microsoft.com/office/powerpoint/2010/main" val="3589927717"/>
               </p:ext>
             </p:extLst>
           </p:nvPr>
@@ -19076,7 +19580,7 @@
                     <a:p>
                       <a:r>
                         <a:rPr lang="en-US" dirty="0" smtClean="0"/>
-                        <a:t>84 (Not finished)</a:t>
+                        <a:t>52</a:t>
                       </a:r>
                       <a:endParaRPr lang="en-US" dirty="0"/>
                     </a:p>

</xml_diff>